<commit_message>
Update Training Neural Networks.pptx
</commit_message>
<xml_diff>
--- a/Week 2 - Training Neural Networks/Training Neural Networks.pptx
+++ b/Week 2 - Training Neural Networks/Training Neural Networks.pptx
@@ -25704,8 +25704,8 @@
           </a:p>
         </p:txBody>
       </p:sp>
-      <mc:AlternateContent xmlns:mc="http://schemas.openxmlformats.org/markup-compatibility/2006" xmlns:a14="http://schemas.microsoft.com/office/drawing/2010/main">
-        <mc:Choice Requires="a14">
+      <mc:AlternateContent xmlns:mc="http://schemas.openxmlformats.org/markup-compatibility/2006">
+        <mc:Choice xmlns:a14="http://schemas.microsoft.com/office/drawing/2010/main" Requires="a14">
           <p:sp>
             <p:nvSpPr>
               <p:cNvPr id="3" name="TextBox 2">
@@ -25720,7 +25720,7 @@
             </p:nvSpPr>
             <p:spPr>
               <a:xfrm>
-                <a:off x="43450" y="713964"/>
+                <a:off x="186890" y="517766"/>
                 <a:ext cx="4386247" cy="1045735"/>
               </a:xfrm>
               <a:prstGeom prst="rect">
@@ -25922,7 +25922,7 @@
             </p:txBody>
           </p:sp>
         </mc:Choice>
-        <mc:Fallback xmlns="">
+        <mc:Fallback>
           <p:sp>
             <p:nvSpPr>
               <p:cNvPr id="3" name="TextBox 2">
@@ -25939,7 +25939,7 @@
             </p:nvSpPr>
             <p:spPr>
               <a:xfrm>
-                <a:off x="43450" y="713964"/>
+                <a:off x="186890" y="517766"/>
                 <a:ext cx="4386247" cy="1045735"/>
               </a:xfrm>
               <a:prstGeom prst="rect">
@@ -25948,7 +25948,7 @@
               <a:blipFill>
                 <a:blip r:embed="rId4"/>
                 <a:stretch>
-                  <a:fillRect/>
+                  <a:fillRect t="-2410" b="-4819"/>
                 </a:stretch>
               </a:blipFill>
             </p:spPr>
@@ -25957,7 +25957,7 @@
               <a:lstStyle/>
               <a:p>
                 <a:r>
-                  <a:rPr lang="en-PH">
+                  <a:rPr lang="en-US">
                     <a:noFill/>
                   </a:rPr>
                   <a:t> </a:t>
@@ -25967,8 +25967,8 @@
           </p:sp>
         </mc:Fallback>
       </mc:AlternateContent>
-      <mc:AlternateContent xmlns:mc="http://schemas.openxmlformats.org/markup-compatibility/2006" xmlns:a14="http://schemas.microsoft.com/office/drawing/2010/main">
-        <mc:Choice Requires="a14">
+      <mc:AlternateContent xmlns:mc="http://schemas.openxmlformats.org/markup-compatibility/2006">
+        <mc:Choice xmlns:a14="http://schemas.microsoft.com/office/drawing/2010/main" Requires="a14">
           <p:sp>
             <p:nvSpPr>
               <p:cNvPr id="6" name="TextBox 5">
@@ -25983,7 +25983,7 @@
             </p:nvSpPr>
             <p:spPr>
               <a:xfrm>
-                <a:off x="286991" y="4258052"/>
+                <a:off x="46339" y="5136387"/>
                 <a:ext cx="4526798" cy="970202"/>
               </a:xfrm>
               <a:prstGeom prst="rect">
@@ -26166,7 +26166,7 @@
             </p:txBody>
           </p:sp>
         </mc:Choice>
-        <mc:Fallback xmlns="">
+        <mc:Fallback>
           <p:sp>
             <p:nvSpPr>
               <p:cNvPr id="6" name="TextBox 5">
@@ -26183,7 +26183,7 @@
             </p:nvSpPr>
             <p:spPr>
               <a:xfrm>
-                <a:off x="286991" y="4258052"/>
+                <a:off x="46339" y="5136387"/>
                 <a:ext cx="4526798" cy="970202"/>
               </a:xfrm>
               <a:prstGeom prst="rect">
@@ -26192,7 +26192,7 @@
               <a:blipFill>
                 <a:blip r:embed="rId5"/>
                 <a:stretch>
-                  <a:fillRect/>
+                  <a:fillRect t="-1250" b="-20000"/>
                 </a:stretch>
               </a:blipFill>
               <a:ln w="38100">
@@ -26206,7 +26206,7 @@
               <a:lstStyle/>
               <a:p>
                 <a:r>
-                  <a:rPr lang="en-PH">
+                  <a:rPr lang="en-US">
                     <a:noFill/>
                   </a:rPr>
                   <a:t> </a:t>
@@ -26232,8 +26232,8 @@
             </p:nvSpPr>
             <p:spPr>
               <a:xfrm>
-                <a:off x="0" y="1860060"/>
-                <a:ext cx="5100780" cy="1045735"/>
+                <a:off x="-193976" y="2815071"/>
+                <a:ext cx="4943183" cy="1045735"/>
               </a:xfrm>
               <a:prstGeom prst="rect">
                 <a:avLst/>
@@ -26321,42 +26321,14 @@
                         <m:t>=</m:t>
                       </m:r>
                       <m:r>
-                        <a:rPr lang="en-US" sz="3000" b="1" i="1" smtClean="0">
+                        <a:rPr lang="en-GB" sz="3000" b="1" i="1" smtClean="0">
                           <a:latin typeface="Cambria Math" panose="02040503050406030204" pitchFamily="18" charset="0"/>
                           <a:ea typeface="Cambria Math" panose="02040503050406030204" pitchFamily="18" charset="0"/>
                         </a:rPr>
-                        <m:t>𝟏</m:t>
+                        <m:t>𝟑</m:t>
                       </m:r>
                       <m:r>
                         <a:rPr lang="en-US" sz="3000" b="1" i="1" smtClean="0">
-                          <a:latin typeface="Cambria Math" panose="02040503050406030204" pitchFamily="18" charset="0"/>
-                          <a:ea typeface="Cambria Math" panose="02040503050406030204" pitchFamily="18" charset="0"/>
-                        </a:rPr>
-                        <m:t>.</m:t>
-                      </m:r>
-                      <m:r>
-                        <a:rPr lang="en-US" sz="3000" b="1" i="1" smtClean="0">
-                          <a:latin typeface="Cambria Math" panose="02040503050406030204" pitchFamily="18" charset="0"/>
-                          <a:ea typeface="Cambria Math" panose="02040503050406030204" pitchFamily="18" charset="0"/>
-                        </a:rPr>
-                        <m:t>𝟓</m:t>
-                      </m:r>
-                      <m:r>
-                        <a:rPr lang="en-US" sz="3000" b="1" i="1">
-                          <a:latin typeface="Cambria Math" panose="02040503050406030204" pitchFamily="18" charset="0"/>
-                          <a:ea typeface="Cambria Math" panose="02040503050406030204" pitchFamily="18" charset="0"/>
-                        </a:rPr>
-                        <m:t>∗</m:t>
-                      </m:r>
-                      <m:r>
-                        <a:rPr lang="en-US" sz="3000" b="1" i="1">
-                          <a:latin typeface="Cambria Math" panose="02040503050406030204" pitchFamily="18" charset="0"/>
-                          <a:ea typeface="Cambria Math" panose="02040503050406030204" pitchFamily="18" charset="0"/>
-                        </a:rPr>
-                        <m:t>𝟐</m:t>
-                      </m:r>
-                      <m:r>
-                        <a:rPr lang="en-US" sz="3000" b="1" i="1">
                           <a:latin typeface="Cambria Math" panose="02040503050406030204" pitchFamily="18" charset="0"/>
                           <a:ea typeface="Cambria Math" panose="02040503050406030204" pitchFamily="18" charset="0"/>
                         </a:rPr>
@@ -26483,8 +26455,8 @@
             </p:nvSpPr>
             <p:spPr>
               <a:xfrm>
-                <a:off x="0" y="1860060"/>
-                <a:ext cx="5100780" cy="1045735"/>
+                <a:off x="-193976" y="2815071"/>
+                <a:ext cx="4943183" cy="1045735"/>
               </a:xfrm>
               <a:prstGeom prst="rect">
                 <a:avLst/>
@@ -26492,7 +26464,7 @@
               <a:blipFill>
                 <a:blip r:embed="rId6"/>
                 <a:stretch>
-                  <a:fillRect b="-3614"/>
+                  <a:fillRect b="-4819"/>
                 </a:stretch>
               </a:blipFill>
             </p:spPr>
@@ -26527,7 +26499,7 @@
             </p:nvSpPr>
             <p:spPr>
               <a:xfrm>
-                <a:off x="32092" y="3006157"/>
+                <a:off x="69325" y="3966231"/>
                 <a:ext cx="5830872" cy="1045735"/>
               </a:xfrm>
               <a:prstGeom prst="rect">
@@ -26620,41 +26592,6 @@
                           <a:latin typeface="Cambria Math" panose="02040503050406030204" pitchFamily="18" charset="0"/>
                           <a:ea typeface="Cambria Math" panose="02040503050406030204" pitchFamily="18" charset="0"/>
                         </a:rPr>
-                        <m:t>𝟏</m:t>
-                      </m:r>
-                      <m:r>
-                        <a:rPr lang="en-US" sz="3000" b="1" i="1" smtClean="0">
-                          <a:latin typeface="Cambria Math" panose="02040503050406030204" pitchFamily="18" charset="0"/>
-                          <a:ea typeface="Cambria Math" panose="02040503050406030204" pitchFamily="18" charset="0"/>
-                        </a:rPr>
-                        <m:t>.</m:t>
-                      </m:r>
-                      <m:r>
-                        <a:rPr lang="en-US" sz="3000" b="1" i="1" smtClean="0">
-                          <a:latin typeface="Cambria Math" panose="02040503050406030204" pitchFamily="18" charset="0"/>
-                          <a:ea typeface="Cambria Math" panose="02040503050406030204" pitchFamily="18" charset="0"/>
-                        </a:rPr>
-                        <m:t>𝟓</m:t>
-                      </m:r>
-                      <m:r>
-                        <a:rPr lang="en-US" sz="3000" b="1" i="1">
-                          <a:latin typeface="Cambria Math" panose="02040503050406030204" pitchFamily="18" charset="0"/>
-                          <a:ea typeface="Cambria Math" panose="02040503050406030204" pitchFamily="18" charset="0"/>
-                        </a:rPr>
-                        <m:t>∗</m:t>
-                      </m:r>
-                      <m:r>
-                        <a:rPr lang="en-US" sz="3000" b="1" i="1">
-                          <a:latin typeface="Cambria Math" panose="02040503050406030204" pitchFamily="18" charset="0"/>
-                          <a:ea typeface="Cambria Math" panose="02040503050406030204" pitchFamily="18" charset="0"/>
-                        </a:rPr>
-                        <m:t>𝟐</m:t>
-                      </m:r>
-                      <m:r>
-                        <a:rPr lang="en-US" sz="3000" b="1" i="1">
-                          <a:latin typeface="Cambria Math" panose="02040503050406030204" pitchFamily="18" charset="0"/>
-                          <a:ea typeface="Cambria Math" panose="02040503050406030204" pitchFamily="18" charset="0"/>
-                        </a:rPr>
                         <m:t> </m:t>
                       </m:r>
                       <m:d>
@@ -26677,6 +26614,27 @@
                               </m:ctrlPr>
                             </m:sSubPr>
                             <m:e>
+                              <m:r>
+                                <a:rPr lang="en-GB" sz="3000" b="1" i="1" smtClean="0">
+                                  <a:latin typeface="Cambria Math" panose="02040503050406030204" pitchFamily="18" charset="0"/>
+                                  <a:ea typeface="Cambria Math" panose="02040503050406030204" pitchFamily="18" charset="0"/>
+                                </a:rPr>
+                                <m:t>(</m:t>
+                              </m:r>
+                              <m:r>
+                                <a:rPr lang="en-GB" sz="3000" b="1" i="1" smtClean="0">
+                                  <a:latin typeface="Cambria Math" panose="02040503050406030204" pitchFamily="18" charset="0"/>
+                                  <a:ea typeface="Cambria Math" panose="02040503050406030204" pitchFamily="18" charset="0"/>
+                                </a:rPr>
+                                <m:t>𝟑</m:t>
+                              </m:r>
+                              <m:r>
+                                <a:rPr lang="en-GB" sz="3000" b="1" i="1" smtClean="0">
+                                  <a:latin typeface="Cambria Math" panose="02040503050406030204" pitchFamily="18" charset="0"/>
+                                  <a:ea typeface="Cambria Math" panose="02040503050406030204" pitchFamily="18" charset="0"/>
+                                </a:rPr>
+                                <m:t>)</m:t>
+                              </m:r>
                               <m:r>
                                 <a:rPr lang="en-US" sz="3000" b="1" i="1" smtClean="0">
                                   <a:latin typeface="Cambria Math" panose="02040503050406030204" pitchFamily="18" charset="0"/>
@@ -26735,6 +26693,25 @@
                             </a:rPr>
                             <m:t>−</m:t>
                           </m:r>
+                          <m:d>
+                            <m:dPr>
+                              <m:ctrlPr>
+                                <a:rPr lang="en-GB" sz="3000" b="1" i="1" smtClean="0">
+                                  <a:latin typeface="Cambria Math" panose="02040503050406030204" pitchFamily="18" charset="0"/>
+                                  <a:ea typeface="Cambria Math" panose="02040503050406030204" pitchFamily="18" charset="0"/>
+                                </a:rPr>
+                              </m:ctrlPr>
+                            </m:dPr>
+                            <m:e>
+                              <m:r>
+                                <a:rPr lang="en-GB" sz="3000" b="1" i="1" smtClean="0">
+                                  <a:latin typeface="Cambria Math" panose="02040503050406030204" pitchFamily="18" charset="0"/>
+                                  <a:ea typeface="Cambria Math" panose="02040503050406030204" pitchFamily="18" charset="0"/>
+                                </a:rPr>
+                                <m:t>𝟑</m:t>
+                              </m:r>
+                            </m:e>
+                          </m:d>
                           <m:r>
                             <a:rPr lang="en-GB" sz="3000" b="1" i="1" smtClean="0">
                               <a:latin typeface="Cambria Math" panose="02040503050406030204" pitchFamily="18" charset="0"/>
@@ -26758,13 +26735,6 @@
                           </m:r>
                         </m:e>
                       </m:d>
-                      <m:r>
-                        <a:rPr lang="en-US" sz="3000" b="1" i="1" smtClean="0">
-                          <a:latin typeface="Cambria Math" panose="02040503050406030204" pitchFamily="18" charset="0"/>
-                          <a:ea typeface="Cambria Math" panose="02040503050406030204" pitchFamily="18" charset="0"/>
-                        </a:rPr>
-                        <m:t>)</m:t>
-                      </m:r>
                     </m:oMath>
                   </m:oMathPara>
                 </a14:m>
@@ -26793,7 +26763,7 @@
             </p:nvSpPr>
             <p:spPr>
               <a:xfrm>
-                <a:off x="32092" y="3006157"/>
+                <a:off x="69325" y="3966231"/>
                 <a:ext cx="5830872" cy="1045735"/>
               </a:xfrm>
               <a:prstGeom prst="rect">
@@ -26802,7 +26772,228 @@
               <a:blipFill>
                 <a:blip r:embed="rId7"/>
                 <a:stretch>
-                  <a:fillRect b="-3571"/>
+                  <a:fillRect b="-3614"/>
+                </a:stretch>
+              </a:blipFill>
+            </p:spPr>
+            <p:txBody>
+              <a:bodyPr/>
+              <a:lstStyle/>
+              <a:p>
+                <a:r>
+                  <a:rPr lang="en-US">
+                    <a:noFill/>
+                  </a:rPr>
+                  <a:t> </a:t>
+                </a:r>
+              </a:p>
+            </p:txBody>
+          </p:sp>
+        </mc:Fallback>
+      </mc:AlternateContent>
+      <mc:AlternateContent xmlns:mc="http://schemas.openxmlformats.org/markup-compatibility/2006">
+        <mc:Choice xmlns:a14="http://schemas.microsoft.com/office/drawing/2010/main" Requires="a14">
+          <p:sp>
+            <p:nvSpPr>
+              <p:cNvPr id="4" name="TextBox 3">
+                <a:extLst>
+                  <a:ext uri="{FF2B5EF4-FFF2-40B4-BE49-F238E27FC236}">
+                    <a16:creationId xmlns:a16="http://schemas.microsoft.com/office/drawing/2014/main" id="{E5A6E19C-8C9B-ABA7-0EEC-5E1742EBADA6}"/>
+                  </a:ext>
+                </a:extLst>
+              </p:cNvPr>
+              <p:cNvSpPr txBox="1"/>
+              <p:nvPr/>
+            </p:nvSpPr>
+            <p:spPr>
+              <a:xfrm>
+                <a:off x="-23542" y="1668926"/>
+                <a:ext cx="3815275" cy="1045735"/>
+              </a:xfrm>
+              <a:prstGeom prst="rect">
+                <a:avLst/>
+              </a:prstGeom>
+              <a:noFill/>
+            </p:spPr>
+            <p:txBody>
+              <a:bodyPr wrap="square" rtlCol="0">
+                <a:spAutoFit/>
+              </a:bodyPr>
+              <a:lstStyle/>
+              <a:p>
+                <a:pPr/>
+                <a14:m>
+                  <m:oMathPara xmlns:m="http://schemas.openxmlformats.org/officeDocument/2006/math">
+                    <m:oMathParaPr>
+                      <m:jc m:val="centerGroup"/>
+                    </m:oMathParaPr>
+                    <m:oMath xmlns:m="http://schemas.openxmlformats.org/officeDocument/2006/math">
+                      <m:f>
+                        <m:fPr>
+                          <m:ctrlPr>
+                            <a:rPr lang="en-US" sz="3000" b="1" i="1" smtClean="0">
+                              <a:latin typeface="Cambria Math" panose="02040503050406030204" pitchFamily="18" charset="0"/>
+                              <a:ea typeface="Cambria Math" panose="02040503050406030204" pitchFamily="18" charset="0"/>
+                            </a:rPr>
+                          </m:ctrlPr>
+                        </m:fPr>
+                        <m:num>
+                          <m:r>
+                            <a:rPr lang="en-US" sz="3000" b="1" i="1" smtClean="0">
+                              <a:latin typeface="Cambria Math" panose="02040503050406030204" pitchFamily="18" charset="0"/>
+                              <a:ea typeface="Cambria Math" panose="02040503050406030204" pitchFamily="18" charset="0"/>
+                            </a:rPr>
+                            <m:t>𝝏</m:t>
+                          </m:r>
+                          <m:r>
+                            <a:rPr lang="en-US" sz="3000" b="1" i="1" smtClean="0">
+                              <a:latin typeface="Cambria Math" panose="02040503050406030204" pitchFamily="18" charset="0"/>
+                              <a:ea typeface="Cambria Math" panose="02040503050406030204" pitchFamily="18" charset="0"/>
+                            </a:rPr>
+                            <m:t>𝑪</m:t>
+                          </m:r>
+                        </m:num>
+                        <m:den>
+                          <m:r>
+                            <a:rPr lang="en-US" sz="3000" b="1" i="1" smtClean="0">
+                              <a:latin typeface="Cambria Math" panose="02040503050406030204" pitchFamily="18" charset="0"/>
+                              <a:ea typeface="Cambria Math" panose="02040503050406030204" pitchFamily="18" charset="0"/>
+                            </a:rPr>
+                            <m:t>𝝏</m:t>
+                          </m:r>
+                          <m:sSub>
+                            <m:sSubPr>
+                              <m:ctrlPr>
+                                <a:rPr lang="en-US" sz="3000" b="1" i="1">
+                                  <a:latin typeface="Cambria Math" panose="02040503050406030204" pitchFamily="18" charset="0"/>
+                                </a:rPr>
+                              </m:ctrlPr>
+                            </m:sSubPr>
+                            <m:e>
+                              <m:r>
+                                <a:rPr lang="en-US" sz="3000" b="1" i="1">
+                                  <a:latin typeface="Cambria Math" panose="02040503050406030204" pitchFamily="18" charset="0"/>
+                                </a:rPr>
+                                <m:t>𝒘</m:t>
+                              </m:r>
+                            </m:e>
+                            <m:sub>
+                              <m:r>
+                                <a:rPr lang="en-US" sz="3000" b="1" i="1">
+                                  <a:latin typeface="Cambria Math" panose="02040503050406030204" pitchFamily="18" charset="0"/>
+                                </a:rPr>
+                                <m:t>𝟏</m:t>
+                              </m:r>
+                            </m:sub>
+                          </m:sSub>
+                        </m:den>
+                      </m:f>
+                      <m:r>
+                        <a:rPr lang="en-US" sz="3000" b="1" i="1">
+                          <a:latin typeface="Cambria Math" panose="02040503050406030204" pitchFamily="18" charset="0"/>
+                          <a:ea typeface="Cambria Math" panose="02040503050406030204" pitchFamily="18" charset="0"/>
+                        </a:rPr>
+                        <m:t>=</m:t>
+                      </m:r>
+                      <m:r>
+                        <a:rPr lang="en-GB" sz="3000" b="1" i="1" smtClean="0">
+                          <a:latin typeface="Cambria Math" panose="02040503050406030204" pitchFamily="18" charset="0"/>
+                          <a:ea typeface="Cambria Math" panose="02040503050406030204" pitchFamily="18" charset="0"/>
+                        </a:rPr>
+                        <m:t>𝟑</m:t>
+                      </m:r>
+                      <m:d>
+                        <m:dPr>
+                          <m:ctrlPr>
+                            <a:rPr lang="en-US" sz="3000" b="1" i="1">
+                              <a:latin typeface="Cambria Math" panose="02040503050406030204" pitchFamily="18" charset="0"/>
+                              <a:ea typeface="Cambria Math" panose="02040503050406030204" pitchFamily="18" charset="0"/>
+                            </a:rPr>
+                          </m:ctrlPr>
+                        </m:dPr>
+                        <m:e>
+                          <m:sSub>
+                            <m:sSubPr>
+                              <m:ctrlPr>
+                                <a:rPr lang="en-US" sz="3000" b="1" i="1">
+                                  <a:latin typeface="Cambria Math" panose="02040503050406030204" pitchFamily="18" charset="0"/>
+                                  <a:ea typeface="Cambria Math" panose="02040503050406030204" pitchFamily="18" charset="0"/>
+                                </a:rPr>
+                              </m:ctrlPr>
+                            </m:sSubPr>
+                            <m:e>
+                              <m:r>
+                                <a:rPr lang="en-US" sz="3000" b="1" i="1">
+                                  <a:latin typeface="Cambria Math" panose="02040503050406030204" pitchFamily="18" charset="0"/>
+                                  <a:ea typeface="Cambria Math" panose="02040503050406030204" pitchFamily="18" charset="0"/>
+                                </a:rPr>
+                                <m:t>𝒛</m:t>
+                              </m:r>
+                            </m:e>
+                            <m:sub>
+                              <m:r>
+                                <a:rPr lang="en-US" sz="3000" b="1" i="1">
+                                  <a:latin typeface="Cambria Math" panose="02040503050406030204" pitchFamily="18" charset="0"/>
+                                  <a:ea typeface="Cambria Math" panose="02040503050406030204" pitchFamily="18" charset="0"/>
+                                </a:rPr>
+                                <m:t>𝟐</m:t>
+                              </m:r>
+                            </m:sub>
+                          </m:sSub>
+                          <m:r>
+                            <a:rPr lang="en-US" sz="3000" b="1" i="1">
+                              <a:latin typeface="Cambria Math" panose="02040503050406030204" pitchFamily="18" charset="0"/>
+                              <a:ea typeface="Cambria Math" panose="02040503050406030204" pitchFamily="18" charset="0"/>
+                            </a:rPr>
+                            <m:t>−</m:t>
+                          </m:r>
+                          <m:r>
+                            <a:rPr lang="en-US" sz="3000" b="1" i="1">
+                              <a:latin typeface="Cambria Math" panose="02040503050406030204" pitchFamily="18" charset="0"/>
+                              <a:ea typeface="Cambria Math" panose="02040503050406030204" pitchFamily="18" charset="0"/>
+                            </a:rPr>
+                            <m:t>𝒚</m:t>
+                          </m:r>
+                        </m:e>
+                      </m:d>
+                    </m:oMath>
+                  </m:oMathPara>
+                </a14:m>
+                <a:endParaRPr lang="en-PH" sz="3000" b="1" dirty="0">
+                  <a:latin typeface="Cambria Math" panose="02040503050406030204" pitchFamily="18" charset="0"/>
+                  <a:ea typeface="Cambria Math" panose="02040503050406030204" pitchFamily="18" charset="0"/>
+                </a:endParaRPr>
+              </a:p>
+            </p:txBody>
+          </p:sp>
+        </mc:Choice>
+        <mc:Fallback>
+          <p:sp>
+            <p:nvSpPr>
+              <p:cNvPr id="4" name="TextBox 3">
+                <a:extLst>
+                  <a:ext uri="{FF2B5EF4-FFF2-40B4-BE49-F238E27FC236}">
+                    <a16:creationId xmlns:a16="http://schemas.microsoft.com/office/drawing/2014/main" id="{E5A6E19C-8C9B-ABA7-0EEC-5E1742EBADA6}"/>
+                  </a:ext>
+                </a:extLst>
+              </p:cNvPr>
+              <p:cNvSpPr txBox="1">
+                <a:spLocks noRot="1" noChangeAspect="1" noMove="1" noResize="1" noEditPoints="1" noAdjustHandles="1" noChangeArrowheads="1" noChangeShapeType="1" noTextEdit="1"/>
+              </p:cNvSpPr>
+              <p:nvPr/>
+            </p:nvSpPr>
+            <p:spPr>
+              <a:xfrm>
+                <a:off x="-23542" y="1668926"/>
+                <a:ext cx="3815275" cy="1045735"/>
+              </a:xfrm>
+              <a:prstGeom prst="rect">
+                <a:avLst/>
+              </a:prstGeom>
+              <a:blipFill>
+                <a:blip r:embed="rId8"/>
+                <a:stretch>
+                  <a:fillRect b="-3614"/>
                 </a:stretch>
               </a:blipFill>
             </p:spPr>

</xml_diff>